<commit_message>
Reformatted PPP to adhere to page limit
</commit_message>
<xml_diff>
--- a/docs/diagrams/SummarySequenceDiagram2.pptx
+++ b/docs/diagrams/SummarySequenceDiagram2.pptx
@@ -197,7 +197,7 @@
           <a:p>
             <a:fld id="{8CC2A4DC-75EB-46D4-9B4A-352FC9F115CD}" type="datetimeFigureOut">
               <a:rPr lang="en-US" smtClean="0"/>
-              <a:t>4/13/2019</a:t>
+              <a:t>4/14/2019</a:t>
             </a:fld>
             <a:endParaRPr lang="en-US" dirty="0"/>
           </a:p>
@@ -611,7 +611,7 @@
           <a:p>
             <a:fld id="{C17442BA-8611-45A4-B205-589CF9359DD4}" type="datetimeFigureOut">
               <a:rPr lang="en-US" smtClean="0"/>
-              <a:t>4/13/2019</a:t>
+              <a:t>4/14/2019</a:t>
             </a:fld>
             <a:endParaRPr lang="en-US" dirty="0"/>
           </a:p>
@@ -809,7 +809,7 @@
           <a:p>
             <a:fld id="{C17442BA-8611-45A4-B205-589CF9359DD4}" type="datetimeFigureOut">
               <a:rPr lang="en-US" smtClean="0"/>
-              <a:t>4/13/2019</a:t>
+              <a:t>4/14/2019</a:t>
             </a:fld>
             <a:endParaRPr lang="en-US" dirty="0"/>
           </a:p>
@@ -1017,7 +1017,7 @@
           <a:p>
             <a:fld id="{C17442BA-8611-45A4-B205-589CF9359DD4}" type="datetimeFigureOut">
               <a:rPr lang="en-US" smtClean="0"/>
-              <a:t>4/13/2019</a:t>
+              <a:t>4/14/2019</a:t>
             </a:fld>
             <a:endParaRPr lang="en-US" dirty="0"/>
           </a:p>
@@ -1215,7 +1215,7 @@
           <a:p>
             <a:fld id="{C17442BA-8611-45A4-B205-589CF9359DD4}" type="datetimeFigureOut">
               <a:rPr lang="en-US" smtClean="0"/>
-              <a:t>4/13/2019</a:t>
+              <a:t>4/14/2019</a:t>
             </a:fld>
             <a:endParaRPr lang="en-US" dirty="0"/>
           </a:p>
@@ -1490,7 +1490,7 @@
           <a:p>
             <a:fld id="{C17442BA-8611-45A4-B205-589CF9359DD4}" type="datetimeFigureOut">
               <a:rPr lang="en-US" smtClean="0"/>
-              <a:t>4/13/2019</a:t>
+              <a:t>4/14/2019</a:t>
             </a:fld>
             <a:endParaRPr lang="en-US" dirty="0"/>
           </a:p>
@@ -1755,7 +1755,7 @@
           <a:p>
             <a:fld id="{C17442BA-8611-45A4-B205-589CF9359DD4}" type="datetimeFigureOut">
               <a:rPr lang="en-US" smtClean="0"/>
-              <a:t>4/13/2019</a:t>
+              <a:t>4/14/2019</a:t>
             </a:fld>
             <a:endParaRPr lang="en-US" dirty="0"/>
           </a:p>
@@ -2167,7 +2167,7 @@
           <a:p>
             <a:fld id="{C17442BA-8611-45A4-B205-589CF9359DD4}" type="datetimeFigureOut">
               <a:rPr lang="en-US" smtClean="0"/>
-              <a:t>4/13/2019</a:t>
+              <a:t>4/14/2019</a:t>
             </a:fld>
             <a:endParaRPr lang="en-US" dirty="0"/>
           </a:p>
@@ -2308,7 +2308,7 @@
           <a:p>
             <a:fld id="{C17442BA-8611-45A4-B205-589CF9359DD4}" type="datetimeFigureOut">
               <a:rPr lang="en-US" smtClean="0"/>
-              <a:t>4/13/2019</a:t>
+              <a:t>4/14/2019</a:t>
             </a:fld>
             <a:endParaRPr lang="en-US" dirty="0"/>
           </a:p>
@@ -2421,7 +2421,7 @@
           <a:p>
             <a:fld id="{C17442BA-8611-45A4-B205-589CF9359DD4}" type="datetimeFigureOut">
               <a:rPr lang="en-US" smtClean="0"/>
-              <a:t>4/13/2019</a:t>
+              <a:t>4/14/2019</a:t>
             </a:fld>
             <a:endParaRPr lang="en-US" dirty="0"/>
           </a:p>
@@ -2732,7 +2732,7 @@
           <a:p>
             <a:fld id="{C17442BA-8611-45A4-B205-589CF9359DD4}" type="datetimeFigureOut">
               <a:rPr lang="en-US" smtClean="0"/>
-              <a:t>4/13/2019</a:t>
+              <a:t>4/14/2019</a:t>
             </a:fld>
             <a:endParaRPr lang="en-US" dirty="0"/>
           </a:p>
@@ -3020,7 +3020,7 @@
           <a:p>
             <a:fld id="{C17442BA-8611-45A4-B205-589CF9359DD4}" type="datetimeFigureOut">
               <a:rPr lang="en-US" smtClean="0"/>
-              <a:t>4/13/2019</a:t>
+              <a:t>4/14/2019</a:t>
             </a:fld>
             <a:endParaRPr lang="en-US" dirty="0"/>
           </a:p>
@@ -3261,7 +3261,7 @@
           <a:p>
             <a:fld id="{C17442BA-8611-45A4-B205-589CF9359DD4}" type="datetimeFigureOut">
               <a:rPr lang="en-US" smtClean="0"/>
-              <a:t>4/13/2019</a:t>
+              <a:t>4/14/2019</a:t>
             </a:fld>
             <a:endParaRPr lang="en-US" dirty="0"/>
           </a:p>
@@ -3692,8 +3692,8 @@
         </p:nvSpPr>
         <p:spPr>
           <a:xfrm>
-            <a:off x="-449293" y="-1611501"/>
-            <a:ext cx="15284416" cy="11029950"/>
+            <a:off x="-622939" y="-564457"/>
+            <a:ext cx="10768988" cy="8399869"/>
           </a:xfrm>
           <a:prstGeom prst="roundRect">
             <a:avLst>
@@ -3751,7 +3751,7 @@
         <p:spPr>
           <a:xfrm>
             <a:off x="1829378" y="3635478"/>
-            <a:ext cx="6713416" cy="4655156"/>
+            <a:ext cx="6713416" cy="3999325"/>
           </a:xfrm>
           <a:prstGeom prst="roundRect">
             <a:avLst>
@@ -3817,8 +3817,8 @@
         </p:nvSpPr>
         <p:spPr>
           <a:xfrm>
-            <a:off x="1095122" y="-353451"/>
-            <a:ext cx="2728710" cy="8634431"/>
+            <a:off x="1095122" y="-353450"/>
+            <a:ext cx="2728710" cy="7984486"/>
           </a:xfrm>
           <a:prstGeom prst="roundRect">
             <a:avLst>

</xml_diff>